<commit_message>
Adiciona slide para apresentação sprint 1
</commit_message>
<xml_diff>
--- a/Documentação/Sprint-1/Apresentacao ILLUMY.pptx
+++ b/Documentação/Sprint-1/Apresentacao ILLUMY.pptx
@@ -6907,8 +6907,16 @@
 </file>
 
 <file path=ppt/slides/slide13.xml><?xml version="1.0" encoding="utf-8"?>
-<p:sld xmlns:a="http://schemas.openxmlformats.org/drawingml/2006/main" xmlns:r="http://schemas.openxmlformats.org/officeDocument/2006/relationships" xmlns:p="http://schemas.openxmlformats.org/presentationml/2006/main">
+<p:sld xmlns:a="http://schemas.openxmlformats.org/drawingml/2006/main" xmlns:r="http://schemas.openxmlformats.org/officeDocument/2006/relationships" xmlns:p="http://schemas.openxmlformats.org/presentationml/2006/main" showMasterSp="0">
   <p:cSld>
+    <p:bg>
+      <p:bgPr>
+        <a:solidFill>
+          <a:schemeClr val="bg1"/>
+        </a:solidFill>
+        <a:effectLst/>
+      </p:bgPr>
+    </p:bg>
     <p:spTree>
       <p:nvGrpSpPr>
         <p:cNvPr id="1" name="Shape 140"/>
@@ -6925,13 +6933,7 @@
       </p:grpSpPr>
       <p:pic>
         <p:nvPicPr>
-          <p:cNvPr id="2" name="Imagem 1">
-            <a:extLst>
-              <a:ext uri="{FF2B5EF4-FFF2-40B4-BE49-F238E27FC236}">
-                <a16:creationId xmlns:a16="http://schemas.microsoft.com/office/drawing/2014/main" id="{A1BB6F70-D0B1-4158-8748-D6352C1B8EF7}"/>
-              </a:ext>
-            </a:extLst>
-          </p:cNvPr>
+          <p:cNvPr id="3" name="Imagem 2"/>
           <p:cNvPicPr>
             <a:picLocks noChangeAspect="1"/>
           </p:cNvPicPr>
@@ -6945,8 +6947,8 @@
         </p:blipFill>
         <p:spPr>
           <a:xfrm>
-            <a:off x="0" y="0"/>
-            <a:ext cx="9144000" cy="5143500"/>
+            <a:off x="0" y="586141"/>
+            <a:ext cx="9144000" cy="4155650"/>
           </a:xfrm>
           <a:prstGeom prst="rect">
             <a:avLst/>
@@ -11800,8 +11802,8 @@
         </p:nvSpPr>
         <p:spPr>
           <a:xfrm>
-            <a:off x="1767839" y="1592370"/>
-            <a:ext cx="7272474" cy="2730154"/>
+            <a:off x="1767839" y="1331750"/>
+            <a:ext cx="7272474" cy="3021596"/>
           </a:xfrm>
           <a:prstGeom prst="rect">
             <a:avLst/>
@@ -12083,13 +12085,22 @@
               <a:t> / Slack/ </a:t>
             </a:r>
             <a:r>
-              <a:rPr lang="pt-BR" sz="2000" dirty="0" err="1"/>
+              <a:rPr lang="pt-BR" sz="2000" dirty="0" err="1" smtClean="0"/>
               <a:t>WebHook</a:t>
             </a:r>
             <a:r>
-              <a:rPr lang="pt-BR" sz="2000" dirty="0"/>
+              <a:rPr lang="pt-BR" sz="2000" dirty="0" smtClean="0"/>
+              <a:t>/ </a:t>
+            </a:r>
+            <a:r>
+              <a:rPr lang="pt-BR" sz="2000" dirty="0" err="1" smtClean="0"/>
+              <a:t>Grafana</a:t>
+            </a:r>
+            <a:r>
+              <a:rPr lang="pt-BR" sz="2000" dirty="0" smtClean="0"/>
               <a:t>;</a:t>
             </a:r>
+            <a:endParaRPr lang="pt-BR" sz="2000" dirty="0"/>
           </a:p>
           <a:p>
             <a:pPr marL="0" indent="0">
@@ -12164,9 +12175,22 @@
               <a:t>Webhook</a:t>
             </a:r>
             <a:r>
-              <a:rPr lang="pt-BR" sz="2000" dirty="0"/>
+              <a:rPr lang="pt-BR" sz="2000" dirty="0" smtClean="0"/>
               <a:t>;</a:t>
             </a:r>
+          </a:p>
+          <a:p>
+            <a:pPr marL="342900" indent="-342900">
+              <a:buClr>
+                <a:schemeClr val="dk1"/>
+              </a:buClr>
+              <a:buSzPts val="1100"/>
+            </a:pPr>
+            <a:r>
+              <a:rPr lang="pt-BR" sz="2000" dirty="0" smtClean="0"/>
+              <a:t>Criptografia de senhas;</a:t>
+            </a:r>
+            <a:endParaRPr lang="pt-BR" sz="2000" dirty="0"/>
           </a:p>
         </p:txBody>
       </p:sp>

</xml_diff>